<commit_message>
Tweaks to the distance sampling ppt
</commit_message>
<xml_diff>
--- a/lessons/Distance Sampling in unmarked.pptx
+++ b/lessons/Distance Sampling in unmarked.pptx
@@ -3983,10 +3983,9 @@
           </a:p>
           <a:p>
             <a:r>
-              <a:rPr lang="en-US"/>
+              <a:rPr lang="en-US" dirty="0"/>
               <a:t>8/10/2020</a:t>
             </a:r>
-            <a:endParaRPr lang="en-US" dirty="0"/>
           </a:p>
         </p:txBody>
       </p:sp>
@@ -4350,16 +4349,20 @@
               <a:t>(</a:t>
             </a:r>
             <a:r>
-              <a:rPr lang="en-US" i="1" dirty="0" err="1"/>
+              <a:rPr lang="en-US" i="1" dirty="0"/>
               <a:t>N</a:t>
             </a:r>
             <a:r>
-              <a:rPr lang="en-US" i="1" baseline="-25000" dirty="0" err="1"/>
+              <a:rPr lang="en-US" i="1" baseline="-25000" dirty="0"/>
               <a:t>i</a:t>
             </a:r>
             <a:r>
-              <a:rPr lang="en-US" i="1" dirty="0" err="1"/>
-              <a:t>,p</a:t>
+              <a:rPr lang="en-US" i="1" dirty="0"/>
+              <a:t>, p</a:t>
+            </a:r>
+            <a:r>
+              <a:rPr lang="en-US" i="1" baseline="-25000" dirty="0"/>
+              <a:t>i</a:t>
             </a:r>
             <a:r>
               <a:rPr lang="en-US" dirty="0"/>
@@ -4542,16 +4545,20 @@
               <a:t>(</a:t>
             </a:r>
             <a:r>
-              <a:rPr lang="en-US" i="1" dirty="0" err="1"/>
+              <a:rPr lang="en-US" i="1" dirty="0"/>
               <a:t>N</a:t>
             </a:r>
             <a:r>
-              <a:rPr lang="en-US" i="1" baseline="-25000" dirty="0" err="1"/>
+              <a:rPr lang="en-US" i="1" baseline="-25000" dirty="0"/>
               <a:t>i</a:t>
             </a:r>
             <a:r>
-              <a:rPr lang="en-US" i="1" dirty="0" err="1"/>
-              <a:t>,p</a:t>
+              <a:rPr lang="en-US" i="1" dirty="0"/>
+              <a:t>, p</a:t>
+            </a:r>
+            <a:r>
+              <a:rPr lang="en-US" i="1" baseline="-25000" dirty="0"/>
+              <a:t>i</a:t>
             </a:r>
             <a:r>
               <a:rPr lang="en-US" dirty="0"/>
@@ -4584,8 +4591,8 @@
           </a:p>
         </p:txBody>
       </p:sp>
-      <mc:AlternateContent xmlns:mc="http://schemas.openxmlformats.org/markup-compatibility/2006" xmlns:a14="http://schemas.microsoft.com/office/drawing/2010/main">
-        <mc:Choice Requires="a14">
+      <mc:AlternateContent xmlns:mc="http://schemas.openxmlformats.org/markup-compatibility/2006">
+        <mc:Choice xmlns:a14="http://schemas.microsoft.com/office/drawing/2010/main" Requires="a14">
           <p:sp>
             <p:nvSpPr>
               <p:cNvPr id="4" name="Rectangle 3">
@@ -4601,7 +4608,7 @@
             <p:spPr>
               <a:xfrm>
                 <a:off x="4323471" y="3478074"/>
-                <a:ext cx="3545058" cy="1500026"/>
+                <a:ext cx="3545058" cy="1512402"/>
               </a:xfrm>
               <a:prstGeom prst="rect">
                 <a:avLst/>
@@ -4645,13 +4652,19 @@
                             <a:rPr lang="en-US" sz="2800" b="0" i="1" smtClean="0">
                               <a:latin typeface="Cambria Math" panose="02040503050406030204" pitchFamily="18" charset="0"/>
                             </a:rPr>
-                            <m:t>𝑦</m:t>
+                            <m:t>𝑑</m:t>
                           </m:r>
                           <m:r>
                             <a:rPr lang="en-US" sz="2800" b="0" i="1" smtClean="0">
                               <a:latin typeface="Cambria Math" panose="02040503050406030204" pitchFamily="18" charset="0"/>
                             </a:rPr>
                             <m:t>)</m:t>
+                          </m:r>
+                          <m:r>
+                            <a:rPr lang="en-US" sz="2800" b="0" i="1" smtClean="0">
+                              <a:latin typeface="Cambria Math" panose="02040503050406030204" pitchFamily="18" charset="0"/>
+                            </a:rPr>
+                            <m:t> </m:t>
                           </m:r>
                         </m:fName>
                         <m:e>
@@ -4700,22 +4713,30 @@
                                   </m:ctrlPr>
                                 </m:fPr>
                                 <m:num>
-                                  <m:sSup>
-                                    <m:sSupPr>
+                                  <m:sSubSup>
+                                    <m:sSubSupPr>
                                       <m:ctrlPr>
                                         <a:rPr lang="en-US" sz="2800" b="0" i="1" smtClean="0">
                                           <a:latin typeface="Cambria Math" panose="02040503050406030204" pitchFamily="18" charset="0"/>
                                         </a:rPr>
                                       </m:ctrlPr>
-                                    </m:sSupPr>
+                                    </m:sSubSupPr>
                                     <m:e>
                                       <m:r>
                                         <a:rPr lang="en-US" sz="2800" b="0" i="1" smtClean="0">
                                           <a:latin typeface="Cambria Math" panose="02040503050406030204" pitchFamily="18" charset="0"/>
                                         </a:rPr>
-                                        <m:t>𝑦</m:t>
+                                        <m:t>𝑑</m:t>
                                       </m:r>
                                     </m:e>
+                                    <m:sub>
+                                      <m:r>
+                                        <a:rPr lang="en-US" sz="2800" b="0" i="1" smtClean="0">
+                                          <a:latin typeface="Cambria Math" panose="02040503050406030204" pitchFamily="18" charset="0"/>
+                                        </a:rPr>
+                                        <m:t>𝑘</m:t>
+                                      </m:r>
+                                    </m:sub>
                                     <m:sup>
                                       <m:r>
                                         <a:rPr lang="en-US" sz="2800" b="0" i="1" smtClean="0">
@@ -4724,7 +4745,7 @@
                                         <m:t>2</m:t>
                                       </m:r>
                                     </m:sup>
-                                  </m:sSup>
+                                  </m:sSubSup>
                                 </m:num>
                                 <m:den>
                                   <m:r>
@@ -4733,23 +4754,31 @@
                                     </a:rPr>
                                     <m:t>2</m:t>
                                   </m:r>
-                                  <m:sSup>
-                                    <m:sSupPr>
+                                  <m:sSubSup>
+                                    <m:sSubSupPr>
                                       <m:ctrlPr>
                                         <a:rPr lang="en-US" sz="2800" b="0" i="1" smtClean="0">
                                           <a:latin typeface="Cambria Math" panose="02040503050406030204" pitchFamily="18" charset="0"/>
                                         </a:rPr>
                                       </m:ctrlPr>
-                                    </m:sSupPr>
+                                    </m:sSubSupPr>
                                     <m:e>
                                       <m:r>
-                                        <a:rPr lang="en-US" sz="2800" b="0" i="1" smtClean="0">
+                                        <a:rPr lang="en-US" sz="2800" i="1">
                                           <a:latin typeface="Cambria Math" panose="02040503050406030204" pitchFamily="18" charset="0"/>
                                           <a:ea typeface="Cambria Math" panose="02040503050406030204" pitchFamily="18" charset="0"/>
                                         </a:rPr>
                                         <m:t>𝜎</m:t>
                                       </m:r>
                                     </m:e>
+                                    <m:sub>
+                                      <m:r>
+                                        <a:rPr lang="en-US" sz="2800" b="0" i="1" smtClean="0">
+                                          <a:latin typeface="Cambria Math" panose="02040503050406030204" pitchFamily="18" charset="0"/>
+                                        </a:rPr>
+                                        <m:t>𝑖</m:t>
+                                      </m:r>
+                                    </m:sub>
                                     <m:sup>
                                       <m:r>
                                         <a:rPr lang="en-US" sz="2800" b="0" i="1" smtClean="0">
@@ -4758,7 +4787,7 @@
                                         <m:t>2</m:t>
                                       </m:r>
                                     </m:sup>
-                                  </m:sSup>
+                                  </m:sSubSup>
                                 </m:den>
                               </m:f>
                             </m:e>
@@ -4816,7 +4845,7 @@
                           <a:rPr lang="en-US" sz="2800" b="0" i="1" smtClean="0">
                             <a:latin typeface="Cambria Math" panose="02040503050406030204" pitchFamily="18" charset="0"/>
                           </a:rPr>
-                          <m:t>𝑦</m:t>
+                          <m:t>𝑑</m:t>
                         </m:r>
                         <m:r>
                           <a:rPr lang="en-US" sz="2800" b="0" i="1" smtClean="0">
@@ -4833,7 +4862,7 @@
             </p:txBody>
           </p:sp>
         </mc:Choice>
-        <mc:Fallback xmlns="">
+        <mc:Fallback>
           <p:sp>
             <p:nvSpPr>
               <p:cNvPr id="4" name="Rectangle 3">
@@ -4851,7 +4880,7 @@
             <p:spPr>
               <a:xfrm>
                 <a:off x="4323471" y="3478074"/>
-                <a:ext cx="3545058" cy="1500026"/>
+                <a:ext cx="3545058" cy="1512402"/>
               </a:xfrm>
               <a:prstGeom prst="rect">
                 <a:avLst/>
@@ -4859,7 +4888,7 @@
               <a:blipFill>
                 <a:blip r:embed="rId2"/>
                 <a:stretch>
-                  <a:fillRect b="-10569"/>
+                  <a:fillRect b="-10484"/>
                 </a:stretch>
               </a:blipFill>
             </p:spPr>
@@ -5936,8 +5965,8 @@
           </p:sp>
         </mc:Fallback>
       </mc:AlternateContent>
-      <mc:AlternateContent xmlns:mc="http://schemas.openxmlformats.org/markup-compatibility/2006" xmlns:a14="http://schemas.microsoft.com/office/drawing/2010/main">
-        <mc:Choice Requires="a14">
+      <mc:AlternateContent xmlns:mc="http://schemas.openxmlformats.org/markup-compatibility/2006">
+        <mc:Choice xmlns:a14="http://schemas.microsoft.com/office/drawing/2010/main" Requires="a14">
           <p:sp>
             <p:nvSpPr>
               <p:cNvPr id="5" name="TextBox 4">
@@ -5953,7 +5982,7 @@
             <p:spPr>
               <a:xfrm>
                 <a:off x="3741412" y="2998113"/>
-                <a:ext cx="3304366" cy="430887"/>
+                <a:ext cx="3537315" cy="430887"/>
               </a:xfrm>
               <a:prstGeom prst="rect">
                 <a:avLst/>
@@ -6019,18 +6048,6 @@
                           </m:ctrlPr>
                         </m:dPr>
                         <m:e>
-                          <m:r>
-                            <a:rPr lang="en-US" sz="2800" b="0" i="1" smtClean="0">
-                              <a:latin typeface="Cambria Math" panose="02040503050406030204" pitchFamily="18" charset="0"/>
-                            </a:rPr>
-                            <m:t>𝑝</m:t>
-                          </m:r>
-                          <m:r>
-                            <a:rPr lang="en-US" sz="2800" b="0" i="1" smtClean="0">
-                              <a:latin typeface="Cambria Math" panose="02040503050406030204" pitchFamily="18" charset="0"/>
-                            </a:rPr>
-                            <m:t>, </m:t>
-                          </m:r>
                           <m:sSub>
                             <m:sSubPr>
                               <m:ctrlPr>
@@ -6056,6 +6073,37 @@
                               </m:r>
                             </m:sub>
                           </m:sSub>
+                          <m:r>
+                            <a:rPr lang="en-US" sz="2800" b="0" i="1" smtClean="0">
+                              <a:latin typeface="Cambria Math" panose="02040503050406030204" pitchFamily="18" charset="0"/>
+                            </a:rPr>
+                            <m:t>,</m:t>
+                          </m:r>
+                          <m:sSub>
+                            <m:sSubPr>
+                              <m:ctrlPr>
+                                <a:rPr lang="en-US" sz="2800" i="1">
+                                  <a:latin typeface="Cambria Math" panose="02040503050406030204" pitchFamily="18" charset="0"/>
+                                </a:rPr>
+                              </m:ctrlPr>
+                            </m:sSubPr>
+                            <m:e>
+                              <m:r>
+                                <a:rPr lang="en-US" sz="2800" i="1">
+                                  <a:latin typeface="Cambria Math" panose="02040503050406030204" pitchFamily="18" charset="0"/>
+                                </a:rPr>
+                                <m:t>𝑝</m:t>
+                              </m:r>
+                            </m:e>
+                            <m:sub>
+                              <m:r>
+                                <a:rPr lang="en-US" sz="2800" i="1">
+                                  <a:latin typeface="Cambria Math" panose="02040503050406030204" pitchFamily="18" charset="0"/>
+                                </a:rPr>
+                                <m:t>𝑖</m:t>
+                              </m:r>
+                            </m:sub>
+                          </m:sSub>
                         </m:e>
                       </m:d>
                     </m:oMath>
@@ -6069,7 +6117,7 @@
             </p:txBody>
           </p:sp>
         </mc:Choice>
-        <mc:Fallback xmlns="">
+        <mc:Fallback>
           <p:sp>
             <p:nvSpPr>
               <p:cNvPr id="5" name="TextBox 4">
@@ -6087,7 +6135,7 @@
             <p:spPr>
               <a:xfrm>
                 <a:off x="3741412" y="2998113"/>
-                <a:ext cx="3304366" cy="430887"/>
+                <a:ext cx="3537315" cy="430887"/>
               </a:xfrm>
               <a:prstGeom prst="rect">
                 <a:avLst/>
@@ -6114,8 +6162,8 @@
           </p:sp>
         </mc:Fallback>
       </mc:AlternateContent>
-      <mc:AlternateContent xmlns:mc="http://schemas.openxmlformats.org/markup-compatibility/2006" xmlns:a14="http://schemas.microsoft.com/office/drawing/2010/main">
-        <mc:Choice Requires="a14">
+      <mc:AlternateContent xmlns:mc="http://schemas.openxmlformats.org/markup-compatibility/2006">
+        <mc:Choice xmlns:a14="http://schemas.microsoft.com/office/drawing/2010/main" Requires="a14">
           <p:sp>
             <p:nvSpPr>
               <p:cNvPr id="7" name="TextBox 6">
@@ -6131,7 +6179,7 @@
             <p:spPr>
               <a:xfrm>
                 <a:off x="3573633" y="3976246"/>
-                <a:ext cx="3840731" cy="430887"/>
+                <a:ext cx="3714799" cy="430887"/>
               </a:xfrm>
               <a:prstGeom prst="rect">
                 <a:avLst/>
@@ -6146,207 +6194,186 @@
               <a:p>
                 <a:pPr/>
                 <a14:m>
-                  <m:oMathPara xmlns:m="http://schemas.openxmlformats.org/officeDocument/2006/math">
-                    <m:oMathParaPr>
-                      <m:jc m:val="centerGroup"/>
-                    </m:oMathParaPr>
-                    <m:oMath xmlns:m="http://schemas.openxmlformats.org/officeDocument/2006/math">
-                      <m:func>
-                        <m:funcPr>
-                          <m:ctrlPr>
-                            <a:rPr lang="en-US" sz="2800" b="0" i="1" smtClean="0">
-                              <a:latin typeface="Cambria Math" panose="02040503050406030204" pitchFamily="18" charset="0"/>
-                            </a:rPr>
-                          </m:ctrlPr>
-                        </m:funcPr>
-                        <m:fName>
-                          <m:r>
-                            <m:rPr>
-                              <m:sty m:val="p"/>
-                            </m:rPr>
-                            <a:rPr lang="en-US" sz="2800" b="0" i="0" smtClean="0">
-                              <a:latin typeface="Cambria Math" panose="02040503050406030204" pitchFamily="18" charset="0"/>
-                            </a:rPr>
-                            <m:t>log</m:t>
-                          </m:r>
-                        </m:fName>
-                        <m:e>
-                          <m:d>
-                            <m:dPr>
-                              <m:ctrlPr>
-                                <a:rPr lang="en-US" sz="2800" b="0" i="1" smtClean="0">
-                                  <a:latin typeface="Cambria Math" panose="02040503050406030204" pitchFamily="18" charset="0"/>
-                                </a:rPr>
-                              </m:ctrlPr>
-                            </m:dPr>
-                            <m:e>
-                              <m:sSub>
-                                <m:sSubPr>
-                                  <m:ctrlPr>
-                                    <a:rPr lang="el-GR" sz="2800" i="1" smtClean="0">
-                                      <a:latin typeface="Cambria Math" panose="02040503050406030204" pitchFamily="18" charset="0"/>
-                                      <a:ea typeface="Cambria Math" panose="02040503050406030204" pitchFamily="18" charset="0"/>
-                                    </a:rPr>
-                                  </m:ctrlPr>
-                                </m:sSubPr>
-                                <m:e>
-                                  <m:r>
-                                    <m:rPr>
-                                      <m:sty m:val="p"/>
-                                    </m:rPr>
-                                    <a:rPr lang="el-GR" sz="2800" i="1" smtClean="0">
-                                      <a:latin typeface="Cambria Math" panose="02040503050406030204" pitchFamily="18" charset="0"/>
-                                      <a:ea typeface="Cambria Math" panose="02040503050406030204" pitchFamily="18" charset="0"/>
-                                    </a:rPr>
-                                    <m:t>λ</m:t>
-                                  </m:r>
-                                </m:e>
-                                <m:sub>
-                                  <m:r>
-                                    <a:rPr lang="en-US" sz="2800" b="0" i="1" smtClean="0">
-                                      <a:latin typeface="Cambria Math" panose="02040503050406030204" pitchFamily="18" charset="0"/>
-                                      <a:ea typeface="Cambria Math" panose="02040503050406030204" pitchFamily="18" charset="0"/>
-                                    </a:rPr>
-                                    <m:t>𝑖</m:t>
-                                  </m:r>
-                                </m:sub>
-                              </m:sSub>
-                            </m:e>
-                          </m:d>
-                        </m:e>
-                      </m:func>
-                      <m:r>
-                        <a:rPr lang="en-US" sz="2800" b="0" i="1" smtClean="0">
-                          <a:latin typeface="Cambria Math" panose="02040503050406030204" pitchFamily="18" charset="0"/>
-                        </a:rPr>
-                        <m:t>=</m:t>
-                      </m:r>
-                      <m:sSub>
-                        <m:sSubPr>
-                          <m:ctrlPr>
-                            <a:rPr lang="en-US" sz="2800" i="1">
-                              <a:latin typeface="Cambria Math" panose="02040503050406030204" pitchFamily="18" charset="0"/>
-                            </a:rPr>
-                          </m:ctrlPr>
-                        </m:sSubPr>
-                        <m:e>
-                          <m:r>
-                            <a:rPr lang="en-US" sz="2800" i="1">
-                              <a:latin typeface="Cambria Math" panose="02040503050406030204" pitchFamily="18" charset="0"/>
-                              <a:ea typeface="Cambria Math" panose="02040503050406030204" pitchFamily="18" charset="0"/>
-                            </a:rPr>
-                            <m:t>𝛽</m:t>
-                          </m:r>
-                        </m:e>
-                        <m:sub>
-                          <m:r>
-                            <a:rPr lang="en-US" sz="2800" i="1">
-                              <a:latin typeface="Cambria Math" panose="02040503050406030204" pitchFamily="18" charset="0"/>
-                            </a:rPr>
-                            <m:t>0</m:t>
-                          </m:r>
-                        </m:sub>
-                      </m:sSub>
-                      <m:r>
-                        <a:rPr lang="en-US" sz="2800" i="1">
-                          <a:latin typeface="Cambria Math" panose="02040503050406030204" pitchFamily="18" charset="0"/>
-                        </a:rPr>
-                        <m:t>+</m:t>
-                      </m:r>
-                      <m:sSub>
-                        <m:sSubPr>
-                          <m:ctrlPr>
-                            <a:rPr lang="en-US" sz="2800" i="1">
-                              <a:latin typeface="Cambria Math" panose="02040503050406030204" pitchFamily="18" charset="0"/>
-                            </a:rPr>
-                          </m:ctrlPr>
-                        </m:sSubPr>
-                        <m:e>
-                          <m:r>
-                            <a:rPr lang="en-US" sz="2800" i="1">
-                              <a:latin typeface="Cambria Math" panose="02040503050406030204" pitchFamily="18" charset="0"/>
-                              <a:ea typeface="Cambria Math" panose="02040503050406030204" pitchFamily="18" charset="0"/>
-                            </a:rPr>
-                            <m:t>𝛽</m:t>
-                          </m:r>
-                        </m:e>
-                        <m:sub>
-                          <m:r>
-                            <a:rPr lang="en-US" sz="2800" i="1">
-                              <a:latin typeface="Cambria Math" panose="02040503050406030204" pitchFamily="18" charset="0"/>
-                            </a:rPr>
-                            <m:t>1</m:t>
-                          </m:r>
-                        </m:sub>
-                      </m:sSub>
-                      <m:sSub>
-                        <m:sSubPr>
-                          <m:ctrlPr>
-                            <a:rPr lang="en-US" sz="2800" b="0" i="1" smtClean="0">
-                              <a:latin typeface="Cambria Math" panose="02040503050406030204" pitchFamily="18" charset="0"/>
-                            </a:rPr>
-                          </m:ctrlPr>
-                        </m:sSubPr>
-                        <m:e>
-                          <m:r>
-                            <a:rPr lang="en-US" sz="2800" b="0" i="1" smtClean="0">
-                              <a:latin typeface="Cambria Math" panose="02040503050406030204" pitchFamily="18" charset="0"/>
-                            </a:rPr>
-                            <m:t>𝑋</m:t>
-                          </m:r>
-                        </m:e>
-                        <m:sub>
-                          <m:r>
-                            <a:rPr lang="en-US" sz="2800" b="0" i="1" smtClean="0">
-                              <a:latin typeface="Cambria Math" panose="02040503050406030204" pitchFamily="18" charset="0"/>
-                            </a:rPr>
-                            <m:t>𝑖</m:t>
-                          </m:r>
-                        </m:sub>
-                      </m:sSub>
-                      <m:r>
-                        <a:rPr lang="en-US" sz="2800" i="1">
-                          <a:latin typeface="Cambria Math" panose="02040503050406030204" pitchFamily="18" charset="0"/>
-                        </a:rPr>
-                        <m:t>+</m:t>
-                      </m:r>
-                      <m:sSub>
-                        <m:sSubPr>
-                          <m:ctrlPr>
-                            <a:rPr lang="en-US" sz="2800" i="1" smtClean="0">
-                              <a:latin typeface="Cambria Math" panose="02040503050406030204" pitchFamily="18" charset="0"/>
-                            </a:rPr>
-                          </m:ctrlPr>
-                        </m:sSubPr>
-                        <m:e>
-                          <m:r>
-                            <a:rPr lang="en-US" sz="2800" i="1" smtClean="0">
-                              <a:latin typeface="Cambria Math" panose="02040503050406030204" pitchFamily="18" charset="0"/>
-                              <a:ea typeface="Cambria Math" panose="02040503050406030204" pitchFamily="18" charset="0"/>
-                            </a:rPr>
-                            <m:t>𝜖</m:t>
-                          </m:r>
-                        </m:e>
-                        <m:sub>
-                          <m:r>
-                            <a:rPr lang="en-US" sz="2800" b="0" i="1" smtClean="0">
-                              <a:latin typeface="Cambria Math" panose="02040503050406030204" pitchFamily="18" charset="0"/>
-                            </a:rPr>
-                            <m:t>𝑡</m:t>
-                          </m:r>
-                        </m:sub>
-                      </m:sSub>
-                    </m:oMath>
-                  </m:oMathPara>
+                  <m:oMath xmlns:m="http://schemas.openxmlformats.org/officeDocument/2006/math">
+                    <m:func>
+                      <m:funcPr>
+                        <m:ctrlPr>
+                          <a:rPr lang="en-US" sz="2800" b="0" i="1" smtClean="0">
+                            <a:latin typeface="Cambria Math" panose="02040503050406030204" pitchFamily="18" charset="0"/>
+                          </a:rPr>
+                        </m:ctrlPr>
+                      </m:funcPr>
+                      <m:fName>
+                        <m:r>
+                          <m:rPr>
+                            <m:sty m:val="p"/>
+                          </m:rPr>
+                          <a:rPr lang="en-US" sz="2800" b="0" i="0" smtClean="0">
+                            <a:latin typeface="Cambria Math" panose="02040503050406030204" pitchFamily="18" charset="0"/>
+                          </a:rPr>
+                          <m:t>log</m:t>
+                        </m:r>
+                      </m:fName>
+                      <m:e>
+                        <m:d>
+                          <m:dPr>
+                            <m:ctrlPr>
+                              <a:rPr lang="en-US" sz="2800" b="0" i="1" smtClean="0">
+                                <a:latin typeface="Cambria Math" panose="02040503050406030204" pitchFamily="18" charset="0"/>
+                              </a:rPr>
+                            </m:ctrlPr>
+                          </m:dPr>
+                          <m:e>
+                            <m:sSub>
+                              <m:sSubPr>
+                                <m:ctrlPr>
+                                  <a:rPr lang="el-GR" sz="2800" i="1" smtClean="0">
+                                    <a:latin typeface="Cambria Math" panose="02040503050406030204" pitchFamily="18" charset="0"/>
+                                    <a:ea typeface="Cambria Math" panose="02040503050406030204" pitchFamily="18" charset="0"/>
+                                  </a:rPr>
+                                </m:ctrlPr>
+                              </m:sSubPr>
+                              <m:e>
+                                <m:r>
+                                  <m:rPr>
+                                    <m:sty m:val="p"/>
+                                  </m:rPr>
+                                  <a:rPr lang="el-GR" sz="2800" i="1" smtClean="0">
+                                    <a:latin typeface="Cambria Math" panose="02040503050406030204" pitchFamily="18" charset="0"/>
+                                    <a:ea typeface="Cambria Math" panose="02040503050406030204" pitchFamily="18" charset="0"/>
+                                  </a:rPr>
+                                  <m:t>λ</m:t>
+                                </m:r>
+                              </m:e>
+                              <m:sub>
+                                <m:r>
+                                  <a:rPr lang="en-US" sz="2800" b="0" i="1" smtClean="0">
+                                    <a:latin typeface="Cambria Math" panose="02040503050406030204" pitchFamily="18" charset="0"/>
+                                    <a:ea typeface="Cambria Math" panose="02040503050406030204" pitchFamily="18" charset="0"/>
+                                  </a:rPr>
+                                  <m:t>𝑖</m:t>
+                                </m:r>
+                              </m:sub>
+                            </m:sSub>
+                          </m:e>
+                        </m:d>
+                      </m:e>
+                    </m:func>
+                    <m:r>
+                      <a:rPr lang="en-US" sz="2800" b="0" i="1" smtClean="0">
+                        <a:latin typeface="Cambria Math" panose="02040503050406030204" pitchFamily="18" charset="0"/>
+                      </a:rPr>
+                      <m:t>=</m:t>
+                    </m:r>
+                    <m:sSub>
+                      <m:sSubPr>
+                        <m:ctrlPr>
+                          <a:rPr lang="en-US" sz="2800" i="1">
+                            <a:latin typeface="Cambria Math" panose="02040503050406030204" pitchFamily="18" charset="0"/>
+                          </a:rPr>
+                        </m:ctrlPr>
+                      </m:sSubPr>
+                      <m:e>
+                        <m:r>
+                          <a:rPr lang="en-US" sz="2800" i="1">
+                            <a:latin typeface="Cambria Math" panose="02040503050406030204" pitchFamily="18" charset="0"/>
+                            <a:ea typeface="Cambria Math" panose="02040503050406030204" pitchFamily="18" charset="0"/>
+                          </a:rPr>
+                          <m:t>𝛽</m:t>
+                        </m:r>
+                      </m:e>
+                      <m:sub>
+                        <m:r>
+                          <a:rPr lang="en-US" sz="2800" i="1">
+                            <a:latin typeface="Cambria Math" panose="02040503050406030204" pitchFamily="18" charset="0"/>
+                          </a:rPr>
+                          <m:t>0</m:t>
+                        </m:r>
+                      </m:sub>
+                    </m:sSub>
+                    <m:r>
+                      <a:rPr lang="en-US" sz="2800" i="1">
+                        <a:latin typeface="Cambria Math" panose="02040503050406030204" pitchFamily="18" charset="0"/>
+                      </a:rPr>
+                      <m:t>+</m:t>
+                    </m:r>
+                    <m:sSub>
+                      <m:sSubPr>
+                        <m:ctrlPr>
+                          <a:rPr lang="en-US" sz="2800" i="1">
+                            <a:latin typeface="Cambria Math" panose="02040503050406030204" pitchFamily="18" charset="0"/>
+                          </a:rPr>
+                        </m:ctrlPr>
+                      </m:sSubPr>
+                      <m:e>
+                        <m:r>
+                          <a:rPr lang="en-US" sz="2800" i="1">
+                            <a:latin typeface="Cambria Math" panose="02040503050406030204" pitchFamily="18" charset="0"/>
+                            <a:ea typeface="Cambria Math" panose="02040503050406030204" pitchFamily="18" charset="0"/>
+                          </a:rPr>
+                          <m:t>𝛽</m:t>
+                        </m:r>
+                      </m:e>
+                      <m:sub>
+                        <m:r>
+                          <a:rPr lang="en-US" sz="2800" i="1">
+                            <a:latin typeface="Cambria Math" panose="02040503050406030204" pitchFamily="18" charset="0"/>
+                          </a:rPr>
+                          <m:t>1</m:t>
+                        </m:r>
+                      </m:sub>
+                    </m:sSub>
+                    <m:sSub>
+                      <m:sSubPr>
+                        <m:ctrlPr>
+                          <a:rPr lang="en-US" sz="2800" b="0" i="1" smtClean="0">
+                            <a:latin typeface="Cambria Math" panose="02040503050406030204" pitchFamily="18" charset="0"/>
+                          </a:rPr>
+                        </m:ctrlPr>
+                      </m:sSubPr>
+                      <m:e>
+                        <m:r>
+                          <a:rPr lang="en-US" sz="2800" b="0" i="1" smtClean="0">
+                            <a:latin typeface="Cambria Math" panose="02040503050406030204" pitchFamily="18" charset="0"/>
+                          </a:rPr>
+                          <m:t>𝑋</m:t>
+                        </m:r>
+                      </m:e>
+                      <m:sub>
+                        <m:r>
+                          <a:rPr lang="en-US" sz="2800" b="0" i="1" smtClean="0">
+                            <a:latin typeface="Cambria Math" panose="02040503050406030204" pitchFamily="18" charset="0"/>
+                          </a:rPr>
+                          <m:t>𝑖</m:t>
+                        </m:r>
+                      </m:sub>
+                    </m:sSub>
+                    <m:r>
+                      <a:rPr lang="en-US" sz="2800" i="1">
+                        <a:latin typeface="Cambria Math" panose="02040503050406030204" pitchFamily="18" charset="0"/>
+                      </a:rPr>
+                      <m:t>+</m:t>
+                    </m:r>
+                    <m:r>
+                      <a:rPr lang="en-US" sz="2800" i="1" smtClean="0">
+                        <a:latin typeface="Cambria Math" panose="02040503050406030204" pitchFamily="18" charset="0"/>
+                        <a:ea typeface="Cambria Math" panose="02040503050406030204" pitchFamily="18" charset="0"/>
+                      </a:rPr>
+                      <m:t>𝜖</m:t>
+                    </m:r>
+                  </m:oMath>
                 </a14:m>
-                <a:endParaRPr lang="en-US" sz="2800" dirty="0">
-                  <a:latin typeface="Lucida Sans" panose="020B0602030504020204" pitchFamily="34" charset="0"/>
-                </a:endParaRPr>
+                <a:r>
+                  <a:rPr lang="en-US" sz="2800" dirty="0">
+                    <a:latin typeface="Lucida Sans" panose="020B0602030504020204" pitchFamily="34" charset="0"/>
+                  </a:rPr>
+                  <a:t> </a:t>
+                </a:r>
               </a:p>
             </p:txBody>
           </p:sp>
         </mc:Choice>
-        <mc:Fallback xmlns="">
+        <mc:Fallback>
           <p:sp>
             <p:nvSpPr>
               <p:cNvPr id="7" name="TextBox 6">
@@ -6364,7 +6391,7 @@
             <p:spPr>
               <a:xfrm>
                 <a:off x="3573633" y="3976246"/>
-                <a:ext cx="3840731" cy="430887"/>
+                <a:ext cx="3714799" cy="430887"/>
               </a:xfrm>
               <a:prstGeom prst="rect">
                 <a:avLst/>
@@ -6391,8 +6418,8 @@
           </p:sp>
         </mc:Fallback>
       </mc:AlternateContent>
-      <mc:AlternateContent xmlns:mc="http://schemas.openxmlformats.org/markup-compatibility/2006" xmlns:a14="http://schemas.microsoft.com/office/drawing/2010/main">
-        <mc:Choice Requires="a14">
+      <mc:AlternateContent xmlns:mc="http://schemas.openxmlformats.org/markup-compatibility/2006">
+        <mc:Choice xmlns:a14="http://schemas.microsoft.com/office/drawing/2010/main" Requires="a14">
           <p:sp>
             <p:nvSpPr>
               <p:cNvPr id="8" name="TextBox 7">
@@ -6408,7 +6435,7 @@
             <p:spPr>
               <a:xfrm>
                 <a:off x="4672684" y="4954379"/>
-                <a:ext cx="1474634" cy="430887"/>
+                <a:ext cx="1731115" cy="430887"/>
               </a:xfrm>
               <a:prstGeom prst="rect">
                 <a:avLst/>
@@ -6428,17 +6455,48 @@
                       <m:jc m:val="centerGroup"/>
                     </m:oMathParaPr>
                     <m:oMath xmlns:m="http://schemas.openxmlformats.org/officeDocument/2006/math">
+                      <m:sSub>
+                        <m:sSubPr>
+                          <m:ctrlPr>
+                            <a:rPr lang="en-US" sz="2800" i="1" smtClean="0">
+                              <a:latin typeface="Cambria Math" panose="02040503050406030204" pitchFamily="18" charset="0"/>
+                            </a:rPr>
+                          </m:ctrlPr>
+                        </m:sSubPr>
+                        <m:e>
+                          <m:r>
+                            <a:rPr lang="en-US" sz="2800" i="1">
+                              <a:latin typeface="Cambria Math" panose="02040503050406030204" pitchFamily="18" charset="0"/>
+                            </a:rPr>
+                            <m:t>𝑝</m:t>
+                          </m:r>
+                        </m:e>
+                        <m:sub>
+                          <m:r>
+                            <a:rPr lang="en-US" sz="2800" i="1">
+                              <a:latin typeface="Cambria Math" panose="02040503050406030204" pitchFamily="18" charset="0"/>
+                            </a:rPr>
+                            <m:t>𝑖</m:t>
+                          </m:r>
+                        </m:sub>
+                      </m:sSub>
                       <m:r>
-                        <a:rPr lang="en-US" sz="2800" b="0" i="1" smtClean="0">
+                        <a:rPr lang="en-US" sz="2800" i="1">
                           <a:latin typeface="Cambria Math" panose="02040503050406030204" pitchFamily="18" charset="0"/>
                         </a:rPr>
-                        <m:t>𝑝</m:t>
+                        <m:t> =</m:t>
                       </m:r>
                       <m:r>
                         <a:rPr lang="en-US" sz="2800" b="0" i="1" smtClean="0">
                           <a:latin typeface="Cambria Math" panose="02040503050406030204" pitchFamily="18" charset="0"/>
                         </a:rPr>
-                        <m:t>=????</m:t>
+                        <m:t> </m:t>
+                      </m:r>
+                      <m:r>
+                        <a:rPr lang="en-US" sz="2800" i="1">
+                          <a:latin typeface="Cambria Math" panose="02040503050406030204" pitchFamily="18" charset="0"/>
+                        </a:rPr>
+                        <m:t>????</m:t>
                       </m:r>
                     </m:oMath>
                   </m:oMathPara>
@@ -6450,7 +6508,7 @@
             </p:txBody>
           </p:sp>
         </mc:Choice>
-        <mc:Fallback xmlns="">
+        <mc:Fallback>
           <p:sp>
             <p:nvSpPr>
               <p:cNvPr id="8" name="TextBox 7">
@@ -6468,7 +6526,7 @@
             <p:spPr>
               <a:xfrm>
                 <a:off x="4672684" y="4954379"/>
-                <a:ext cx="1474634" cy="430887"/>
+                <a:ext cx="1731115" cy="430887"/>
               </a:xfrm>
               <a:prstGeom prst="rect">
                 <a:avLst/>
@@ -8870,8 +8928,8 @@
           </p:sp>
         </mc:Fallback>
       </mc:AlternateContent>
-      <mc:AlternateContent xmlns:mc="http://schemas.openxmlformats.org/markup-compatibility/2006" xmlns:a14="http://schemas.microsoft.com/office/drawing/2010/main">
-        <mc:Choice Requires="a14">
+      <mc:AlternateContent xmlns:mc="http://schemas.openxmlformats.org/markup-compatibility/2006">
+        <mc:Choice xmlns:a14="http://schemas.microsoft.com/office/drawing/2010/main" Requires="a14">
           <p:sp>
             <p:nvSpPr>
               <p:cNvPr id="18" name="Rectangle 17">
@@ -8887,7 +8945,7 @@
             <p:spPr>
               <a:xfrm>
                 <a:off x="2840272" y="2252748"/>
-                <a:ext cx="5379996" cy="1107291"/>
+                <a:ext cx="5379996" cy="1108445"/>
               </a:xfrm>
               <a:prstGeom prst="rect">
                 <a:avLst/>
@@ -9019,14 +9077,14 @@
                                     </a:rPr>
                                     <m:t>2</m:t>
                                   </m:r>
-                                  <m:sSup>
-                                    <m:sSupPr>
+                                  <m:sSubSup>
+                                    <m:sSubSupPr>
                                       <m:ctrlPr>
                                         <a:rPr lang="en-US" sz="2800" b="0" i="1" smtClean="0">
                                           <a:latin typeface="Cambria Math" panose="02040503050406030204" pitchFamily="18" charset="0"/>
                                         </a:rPr>
                                       </m:ctrlPr>
-                                    </m:sSupPr>
+                                    </m:sSubSupPr>
                                     <m:e>
                                       <m:r>
                                         <a:rPr lang="en-US" sz="2800" b="0" i="1" smtClean="0">
@@ -9036,6 +9094,14 @@
                                         <m:t>𝜎</m:t>
                                       </m:r>
                                     </m:e>
+                                    <m:sub>
+                                      <m:r>
+                                        <a:rPr lang="en-US" sz="2800" b="0" i="1" smtClean="0">
+                                          <a:latin typeface="Cambria Math" panose="02040503050406030204" pitchFamily="18" charset="0"/>
+                                        </a:rPr>
+                                        <m:t>𝑖</m:t>
+                                      </m:r>
+                                    </m:sub>
                                     <m:sup>
                                       <m:r>
                                         <a:rPr lang="en-US" sz="2800" b="0" i="1" smtClean="0">
@@ -9044,7 +9110,7 @@
                                         <m:t>2</m:t>
                                       </m:r>
                                     </m:sup>
-                                  </m:sSup>
+                                  </m:sSubSup>
                                 </m:den>
                               </m:f>
                             </m:e>
@@ -9059,7 +9125,7 @@
             </p:txBody>
           </p:sp>
         </mc:Choice>
-        <mc:Fallback xmlns="">
+        <mc:Fallback>
           <p:sp>
             <p:nvSpPr>
               <p:cNvPr id="18" name="Rectangle 17">
@@ -9077,7 +9143,7 @@
             <p:spPr>
               <a:xfrm>
                 <a:off x="2840272" y="2252748"/>
-                <a:ext cx="5379996" cy="1107291"/>
+                <a:ext cx="5379996" cy="1108445"/>
               </a:xfrm>
               <a:prstGeom prst="rect">
                 <a:avLst/>

</xml_diff>